<commit_message>
minor edit to one slide
</commit_message>
<xml_diff>
--- a/PowerPoints/16 - Records.pptx
+++ b/PowerPoints/16 - Records.pptx
@@ -6085,18 +6085,11 @@
               <a:t>paramId</a:t>
             </a:r>
             <a:r>
-              <a:rPr lang="en-US" sz="1800">
-                <a:latin typeface="Consolas" pitchFamily="49" charset="0"/>
-                <a:cs typeface="Consolas" pitchFamily="49" charset="0"/>
-              </a:rPr>
-              <a:t> ) </a:t>
-            </a:r>
-            <a:r>
               <a:rPr lang="en-US" sz="1800" dirty="0">
                 <a:latin typeface="Consolas" pitchFamily="49" charset="0"/>
                 <a:cs typeface="Consolas" pitchFamily="49" charset="0"/>
               </a:rPr>
-              <a:t>{ </a:t>
+              <a:t> ) { </a:t>
             </a:r>
             <a:r>
               <a:rPr lang="en-US" sz="1800" dirty="0" err="1">
@@ -6125,42 +6118,6 @@
                 <a:cs typeface="Consolas" pitchFamily="49" charset="0"/>
               </a:rPr>
               <a:t> } .</a:t>
-            </a:r>
-          </a:p>
-          <a:p>
-            <a:pPr marL="182880" indent="0">
-              <a:spcBef>
-                <a:spcPts val="0"/>
-              </a:spcBef>
-              <a:buFontTx/>
-              <a:buNone/>
-            </a:pPr>
-            <a:endParaRPr lang="en-US" sz="1800" dirty="0">
-              <a:latin typeface="Consolas" pitchFamily="49" charset="0"/>
-              <a:cs typeface="Consolas" pitchFamily="49" charset="0"/>
-            </a:endParaRPr>
-          </a:p>
-          <a:p>
-            <a:pPr marL="182880" indent="0">
-              <a:spcBef>
-                <a:spcPts val="0"/>
-              </a:spcBef>
-              <a:buFontTx/>
-              <a:buNone/>
-            </a:pPr>
-            <a:r>
-              <a:rPr lang="en-US" sz="1800" dirty="0" err="1">
-                <a:latin typeface="Consolas" pitchFamily="49" charset="0"/>
-                <a:cs typeface="Consolas" pitchFamily="49" charset="0"/>
-              </a:rPr>
-              <a:t>indexExpr</a:t>
-            </a:r>
-            <a:r>
-              <a:rPr lang="en-US" sz="1800" dirty="0">
-                <a:latin typeface="Consolas" pitchFamily="49" charset="0"/>
-                <a:cs typeface="Consolas" pitchFamily="49" charset="0"/>
-              </a:rPr>
-              <a:t>  = "[" expression "]" .</a:t>
             </a:r>
           </a:p>
           <a:p>

</xml_diff>